<commit_message>
Fix overly large code font size in recent knits
Prior to this commit, rekniting slides results in code chunk font sizes
larger than before, causing some sections to overflow off the slide.
This commit edits Images/template.pptx to restore formatting to as close
as possible the original look. This was done by editing the headings in
the Master Slide. The fix isn't perfect, notably whenever normal text is
used now with no heading at all, it is too small. As a result, I've
edited Rmd files where neccessary to ensure all normal text has bullets.
I then reknit all Rmd files with the new template and looked them over
to make sure nothing looks dodgy.
</commit_message>
<xml_diff>
--- a/Images/template.pptx
+++ b/Images/template.pptx
@@ -262,7 +262,7 @@
           <a:p>
             <a:fld id="{937E6D32-4C03-264D-8FDB-034DA7582E3B}" type="datetimeFigureOut">
               <a:rPr lang="en-US" smtClean="0"/>
-              <a:t>8/27/19</a:t>
+              <a:t>9/21/2021</a:t>
             </a:fld>
             <a:endParaRPr lang="en-US"/>
           </a:p>
@@ -460,7 +460,7 @@
           <a:p>
             <a:fld id="{937E6D32-4C03-264D-8FDB-034DA7582E3B}" type="datetimeFigureOut">
               <a:rPr lang="en-US" smtClean="0"/>
-              <a:t>8/27/19</a:t>
+              <a:t>9/21/2021</a:t>
             </a:fld>
             <a:endParaRPr lang="en-US"/>
           </a:p>
@@ -668,7 +668,7 @@
           <a:p>
             <a:fld id="{937E6D32-4C03-264D-8FDB-034DA7582E3B}" type="datetimeFigureOut">
               <a:rPr lang="en-US" smtClean="0"/>
-              <a:t>8/27/19</a:t>
+              <a:t>9/21/2021</a:t>
             </a:fld>
             <a:endParaRPr lang="en-US"/>
           </a:p>
@@ -866,7 +866,7 @@
           <a:p>
             <a:fld id="{937E6D32-4C03-264D-8FDB-034DA7582E3B}" type="datetimeFigureOut">
               <a:rPr lang="en-US" smtClean="0"/>
-              <a:t>8/27/19</a:t>
+              <a:t>9/21/2021</a:t>
             </a:fld>
             <a:endParaRPr lang="en-US"/>
           </a:p>
@@ -1141,7 +1141,7 @@
           <a:p>
             <a:fld id="{937E6D32-4C03-264D-8FDB-034DA7582E3B}" type="datetimeFigureOut">
               <a:rPr lang="en-US" smtClean="0"/>
-              <a:t>8/27/19</a:t>
+              <a:t>9/21/2021</a:t>
             </a:fld>
             <a:endParaRPr lang="en-US"/>
           </a:p>
@@ -1406,7 +1406,7 @@
           <a:p>
             <a:fld id="{937E6D32-4C03-264D-8FDB-034DA7582E3B}" type="datetimeFigureOut">
               <a:rPr lang="en-US" smtClean="0"/>
-              <a:t>8/27/19</a:t>
+              <a:t>9/21/2021</a:t>
             </a:fld>
             <a:endParaRPr lang="en-US"/>
           </a:p>
@@ -1818,7 +1818,7 @@
           <a:p>
             <a:fld id="{937E6D32-4C03-264D-8FDB-034DA7582E3B}" type="datetimeFigureOut">
               <a:rPr lang="en-US" smtClean="0"/>
-              <a:t>8/27/19</a:t>
+              <a:t>9/21/2021</a:t>
             </a:fld>
             <a:endParaRPr lang="en-US"/>
           </a:p>
@@ -1959,7 +1959,7 @@
           <a:p>
             <a:fld id="{937E6D32-4C03-264D-8FDB-034DA7582E3B}" type="datetimeFigureOut">
               <a:rPr lang="en-US" smtClean="0"/>
-              <a:t>8/27/19</a:t>
+              <a:t>9/21/2021</a:t>
             </a:fld>
             <a:endParaRPr lang="en-US"/>
           </a:p>
@@ -2072,7 +2072,7 @@
           <a:p>
             <a:fld id="{937E6D32-4C03-264D-8FDB-034DA7582E3B}" type="datetimeFigureOut">
               <a:rPr lang="en-US" smtClean="0"/>
-              <a:t>8/27/19</a:t>
+              <a:t>9/21/2021</a:t>
             </a:fld>
             <a:endParaRPr lang="en-US"/>
           </a:p>
@@ -2383,7 +2383,7 @@
           <a:p>
             <a:fld id="{937E6D32-4C03-264D-8FDB-034DA7582E3B}" type="datetimeFigureOut">
               <a:rPr lang="en-US" smtClean="0"/>
-              <a:t>8/27/19</a:t>
+              <a:t>9/21/2021</a:t>
             </a:fld>
             <a:endParaRPr lang="en-US"/>
           </a:p>
@@ -2671,7 +2671,7 @@
           <a:p>
             <a:fld id="{937E6D32-4C03-264D-8FDB-034DA7582E3B}" type="datetimeFigureOut">
               <a:rPr lang="en-US" smtClean="0"/>
-              <a:t>8/27/19</a:t>
+              <a:t>9/21/2021</a:t>
             </a:fld>
             <a:endParaRPr lang="en-US"/>
           </a:p>
@@ -2837,35 +2837,35 @@
           <a:p>
             <a:pPr lvl="0"/>
             <a:r>
-              <a:rPr lang="en-US"/>
+              <a:rPr lang="en-US" dirty="0"/>
               <a:t>Click to edit Master text styles</a:t>
             </a:r>
           </a:p>
           <a:p>
             <a:pPr lvl="1"/>
             <a:r>
-              <a:rPr lang="en-US"/>
+              <a:rPr lang="en-US" dirty="0"/>
               <a:t>Second level</a:t>
             </a:r>
           </a:p>
           <a:p>
             <a:pPr lvl="2"/>
             <a:r>
-              <a:rPr lang="en-US"/>
+              <a:rPr lang="en-US" dirty="0"/>
               <a:t>Third level</a:t>
             </a:r>
           </a:p>
           <a:p>
             <a:pPr lvl="3"/>
             <a:r>
-              <a:rPr lang="en-US"/>
+              <a:rPr lang="en-US" dirty="0"/>
               <a:t>Fourth level</a:t>
             </a:r>
           </a:p>
           <a:p>
             <a:pPr lvl="4"/>
             <a:r>
-              <a:rPr lang="en-US"/>
+              <a:rPr lang="en-US" dirty="0"/>
               <a:t>Fifth level</a:t>
             </a:r>
           </a:p>
@@ -2912,7 +2912,7 @@
           <a:p>
             <a:fld id="{937E6D32-4C03-264D-8FDB-034DA7582E3B}" type="datetimeFigureOut">
               <a:rPr lang="en-US" smtClean="0"/>
-              <a:t>8/27/19</a:t>
+              <a:t>9/21/2021</a:t>
             </a:fld>
             <a:endParaRPr lang="en-US"/>
           </a:p>
@@ -3050,7 +3050,7 @@
       </a:lvl1pPr>
     </p:titleStyle>
     <p:bodyStyle>
-      <a:lvl1pPr marL="228600" indent="-228600" algn="l" defTabSz="914400" rtl="0" eaLnBrk="1" latinLnBrk="0" hangingPunct="1">
+      <a:lvl1pPr marL="1144800" indent="-228600" algn="l" defTabSz="914400" rtl="0" eaLnBrk="1" latinLnBrk="0" hangingPunct="1">
         <a:lnSpc>
           <a:spcPct val="90000"/>
         </a:lnSpc>
@@ -3059,7 +3059,7 @@
         </a:spcBef>
         <a:buFont typeface="Arial" panose="020B0604020202020204" pitchFamily="34" charset="0"/>
         <a:buChar char="•"/>
-        <a:defRPr sz="2800" kern="1200">
+        <a:defRPr sz="1800" kern="1200">
           <a:solidFill>
             <a:schemeClr val="tx1"/>
           </a:solidFill>
@@ -3077,7 +3077,7 @@
         </a:spcBef>
         <a:buFont typeface="Arial" panose="020B0604020202020204" pitchFamily="34" charset="0"/>
         <a:buChar char="•"/>
-        <a:defRPr sz="2400" kern="1200">
+        <a:defRPr sz="2300" kern="1200">
           <a:solidFill>
             <a:schemeClr val="tx1"/>
           </a:solidFill>

</xml_diff>

<commit_message>
fix: indentation and levels in template
First level of list format was smaller and more indented than second. Altered template to fix this.
</commit_message>
<xml_diff>
--- a/Images/template.pptx
+++ b/Images/template.pptx
@@ -115,6 +115,43 @@
 </p:presentation>
 </file>
 
+<file path=ppt/revisionInfo.xml><?xml version="1.0" encoding="utf-8"?>
+<p1510:revInfo xmlns:a="http://schemas.openxmlformats.org/drawingml/2006/main" xmlns:r="http://schemas.openxmlformats.org/officeDocument/2006/relationships" xmlns:p1510="http://schemas.microsoft.com/office/powerpoint/2015/10/main">
+  <p1510:revLst>
+    <p1510:client id="{99A65AE2-D1ED-48CB-B96E-8D4E7F8DED22}" v="6" dt="2022-10-09T12:05:03.892"/>
+  </p1510:revLst>
+</p1510:revInfo>
+</file>
+
+<file path=ppt/changesInfos/changesInfo1.xml><?xml version="1.0" encoding="utf-8"?>
+<pc:chgInfo xmlns:a="http://schemas.openxmlformats.org/drawingml/2006/main" xmlns:r="http://schemas.openxmlformats.org/officeDocument/2006/relationships" xmlns:ac="http://schemas.microsoft.com/office/drawing/2013/main/command" xmlns:pc="http://schemas.microsoft.com/office/powerpoint/2013/main/command">
+  <pc:docChgLst>
+    <pc:chgData name="Reynolds, Regina" userId="2652d5c2-0505-448f-95c7-d32f44f13439" providerId="ADAL" clId="{99A65AE2-D1ED-48CB-B96E-8D4E7F8DED22}"/>
+    <pc:docChg chg="modMainMaster">
+      <pc:chgData name="Reynolds, Regina" userId="2652d5c2-0505-448f-95c7-d32f44f13439" providerId="ADAL" clId="{99A65AE2-D1ED-48CB-B96E-8D4E7F8DED22}" dt="2022-10-09T12:05:03.892" v="4" actId="404"/>
+      <pc:docMkLst>
+        <pc:docMk/>
+      </pc:docMkLst>
+      <pc:sldMasterChg chg="modSp">
+        <pc:chgData name="Reynolds, Regina" userId="2652d5c2-0505-448f-95c7-d32f44f13439" providerId="ADAL" clId="{99A65AE2-D1ED-48CB-B96E-8D4E7F8DED22}" dt="2022-10-09T12:05:03.892" v="4" actId="404"/>
+        <pc:sldMasterMkLst>
+          <pc:docMk/>
+          <pc:sldMasterMk cId="1103004113" sldId="2147483648"/>
+        </pc:sldMasterMkLst>
+        <pc:spChg chg="mod">
+          <ac:chgData name="Reynolds, Regina" userId="2652d5c2-0505-448f-95c7-d32f44f13439" providerId="ADAL" clId="{99A65AE2-D1ED-48CB-B96E-8D4E7F8DED22}" dt="2022-10-09T12:05:03.892" v="4" actId="404"/>
+          <ac:spMkLst>
+            <pc:docMk/>
+            <pc:sldMasterMk cId="1103004113" sldId="2147483648"/>
+            <ac:spMk id="3" creationId="{7CCAB061-79B5-4A4B-9136-7AD1C74E05A4}"/>
+          </ac:spMkLst>
+        </pc:spChg>
+      </pc:sldMasterChg>
+    </pc:docChg>
+  </pc:docChgLst>
+</pc:chgInfo>
+</file>
+
 <file path=ppt/slideLayouts/slideLayout1.xml><?xml version="1.0" encoding="utf-8"?>
 <p:sldLayout xmlns:a="http://schemas.openxmlformats.org/drawingml/2006/main" xmlns:r="http://schemas.openxmlformats.org/officeDocument/2006/relationships" xmlns:p="http://schemas.openxmlformats.org/presentationml/2006/main" type="title" preserve="1">
   <p:cSld name="Title Slide">
@@ -262,7 +299,7 @@
           <a:p>
             <a:fld id="{937E6D32-4C03-264D-8FDB-034DA7582E3B}" type="datetimeFigureOut">
               <a:rPr lang="en-US" smtClean="0"/>
-              <a:t>9/21/2021</a:t>
+              <a:t>10/9/2022</a:t>
             </a:fld>
             <a:endParaRPr lang="en-US"/>
           </a:p>
@@ -460,7 +497,7 @@
           <a:p>
             <a:fld id="{937E6D32-4C03-264D-8FDB-034DA7582E3B}" type="datetimeFigureOut">
               <a:rPr lang="en-US" smtClean="0"/>
-              <a:t>9/21/2021</a:t>
+              <a:t>10/9/2022</a:t>
             </a:fld>
             <a:endParaRPr lang="en-US"/>
           </a:p>
@@ -668,7 +705,7 @@
           <a:p>
             <a:fld id="{937E6D32-4C03-264D-8FDB-034DA7582E3B}" type="datetimeFigureOut">
               <a:rPr lang="en-US" smtClean="0"/>
-              <a:t>9/21/2021</a:t>
+              <a:t>10/9/2022</a:t>
             </a:fld>
             <a:endParaRPr lang="en-US"/>
           </a:p>
@@ -866,7 +903,7 @@
           <a:p>
             <a:fld id="{937E6D32-4C03-264D-8FDB-034DA7582E3B}" type="datetimeFigureOut">
               <a:rPr lang="en-US" smtClean="0"/>
-              <a:t>9/21/2021</a:t>
+              <a:t>10/9/2022</a:t>
             </a:fld>
             <a:endParaRPr lang="en-US"/>
           </a:p>
@@ -1141,7 +1178,7 @@
           <a:p>
             <a:fld id="{937E6D32-4C03-264D-8FDB-034DA7582E3B}" type="datetimeFigureOut">
               <a:rPr lang="en-US" smtClean="0"/>
-              <a:t>9/21/2021</a:t>
+              <a:t>10/9/2022</a:t>
             </a:fld>
             <a:endParaRPr lang="en-US"/>
           </a:p>
@@ -1406,7 +1443,7 @@
           <a:p>
             <a:fld id="{937E6D32-4C03-264D-8FDB-034DA7582E3B}" type="datetimeFigureOut">
               <a:rPr lang="en-US" smtClean="0"/>
-              <a:t>9/21/2021</a:t>
+              <a:t>10/9/2022</a:t>
             </a:fld>
             <a:endParaRPr lang="en-US"/>
           </a:p>
@@ -1818,7 +1855,7 @@
           <a:p>
             <a:fld id="{937E6D32-4C03-264D-8FDB-034DA7582E3B}" type="datetimeFigureOut">
               <a:rPr lang="en-US" smtClean="0"/>
-              <a:t>9/21/2021</a:t>
+              <a:t>10/9/2022</a:t>
             </a:fld>
             <a:endParaRPr lang="en-US"/>
           </a:p>
@@ -1959,7 +1996,7 @@
           <a:p>
             <a:fld id="{937E6D32-4C03-264D-8FDB-034DA7582E3B}" type="datetimeFigureOut">
               <a:rPr lang="en-US" smtClean="0"/>
-              <a:t>9/21/2021</a:t>
+              <a:t>10/9/2022</a:t>
             </a:fld>
             <a:endParaRPr lang="en-US"/>
           </a:p>
@@ -2072,7 +2109,7 @@
           <a:p>
             <a:fld id="{937E6D32-4C03-264D-8FDB-034DA7582E3B}" type="datetimeFigureOut">
               <a:rPr lang="en-US" smtClean="0"/>
-              <a:t>9/21/2021</a:t>
+              <a:t>10/9/2022</a:t>
             </a:fld>
             <a:endParaRPr lang="en-US"/>
           </a:p>
@@ -2383,7 +2420,7 @@
           <a:p>
             <a:fld id="{937E6D32-4C03-264D-8FDB-034DA7582E3B}" type="datetimeFigureOut">
               <a:rPr lang="en-US" smtClean="0"/>
-              <a:t>9/21/2021</a:t>
+              <a:t>10/9/2022</a:t>
             </a:fld>
             <a:endParaRPr lang="en-US"/>
           </a:p>
@@ -2671,7 +2708,7 @@
           <a:p>
             <a:fld id="{937E6D32-4C03-264D-8FDB-034DA7582E3B}" type="datetimeFigureOut">
               <a:rPr lang="en-US" smtClean="0"/>
-              <a:t>9/21/2021</a:t>
+              <a:t>10/9/2022</a:t>
             </a:fld>
             <a:endParaRPr lang="en-US"/>
           </a:p>
@@ -2912,7 +2949,7 @@
           <a:p>
             <a:fld id="{937E6D32-4C03-264D-8FDB-034DA7582E3B}" type="datetimeFigureOut">
               <a:rPr lang="en-US" smtClean="0"/>
-              <a:t>9/21/2021</a:t>
+              <a:t>10/9/2022</a:t>
             </a:fld>
             <a:endParaRPr lang="en-US"/>
           </a:p>
@@ -3050,16 +3087,16 @@
       </a:lvl1pPr>
     </p:titleStyle>
     <p:bodyStyle>
-      <a:lvl1pPr marL="1144800" indent="-228600" algn="l" defTabSz="914400" rtl="0" eaLnBrk="1" latinLnBrk="0" hangingPunct="1">
+      <a:lvl1pPr marL="230400" indent="-228600" algn="l" defTabSz="914400" rtl="0" eaLnBrk="1" latinLnBrk="0" hangingPunct="1">
         <a:lnSpc>
           <a:spcPct val="90000"/>
         </a:lnSpc>
         <a:spcBef>
-          <a:spcPts val="1000"/>
+          <a:spcPts val="500"/>
         </a:spcBef>
         <a:buFont typeface="Arial" panose="020B0604020202020204" pitchFamily="34" charset="0"/>
         <a:buChar char="•"/>
-        <a:defRPr sz="1800" kern="1200">
+        <a:defRPr sz="2000" kern="1200">
           <a:solidFill>
             <a:schemeClr val="tx1"/>
           </a:solidFill>
@@ -3077,7 +3114,7 @@
         </a:spcBef>
         <a:buFont typeface="Arial" panose="020B0604020202020204" pitchFamily="34" charset="0"/>
         <a:buChar char="•"/>
-        <a:defRPr sz="2300" kern="1200">
+        <a:defRPr sz="1800" kern="1200">
           <a:solidFill>
             <a:schemeClr val="tx1"/>
           </a:solidFill>
@@ -3095,7 +3132,7 @@
         </a:spcBef>
         <a:buFont typeface="Arial" panose="020B0604020202020204" pitchFamily="34" charset="0"/>
         <a:buChar char="•"/>
-        <a:defRPr sz="2000" kern="1200">
+        <a:defRPr sz="1800" kern="1200">
           <a:solidFill>
             <a:schemeClr val="tx1"/>
           </a:solidFill>
@@ -3113,7 +3150,7 @@
         </a:spcBef>
         <a:buFont typeface="Arial" panose="020B0604020202020204" pitchFamily="34" charset="0"/>
         <a:buChar char="•"/>
-        <a:defRPr sz="1800" kern="1200">
+        <a:defRPr sz="1600" kern="1200">
           <a:solidFill>
             <a:schemeClr val="tx1"/>
           </a:solidFill>
@@ -3131,7 +3168,7 @@
         </a:spcBef>
         <a:buFont typeface="Arial" panose="020B0604020202020204" pitchFamily="34" charset="0"/>
         <a:buChar char="•"/>
-        <a:defRPr sz="1800" kern="1200">
+        <a:defRPr sz="1600" kern="1200">
           <a:solidFill>
             <a:schemeClr val="tx1"/>
           </a:solidFill>

</xml_diff>